<commit_message>
Site updated: 2017-03-29 21:24:47
</commit_message>
<xml_diff>
--- a/blog画图.pptx
+++ b/blog画图.pptx
@@ -7,6 +7,8 @@
   <p:sldIdLst>
     <p:sldId id="256" r:id="rId2"/>
     <p:sldId id="257" r:id="rId3"/>
+    <p:sldId id="258" r:id="rId4"/>
+    <p:sldId id="259" r:id="rId5"/>
   </p:sldIdLst>
   <p:sldSz cx="12192000" cy="6858000"/>
   <p:notesSz cx="6858000" cy="9144000"/>
@@ -242,7 +244,7 @@
           <a:p>
             <a:fld id="{CC7A7E01-F9FB-40F2-8C4B-BBA055699810}" type="datetimeFigureOut">
               <a:rPr lang="zh-CN" altLang="en-US" smtClean="0"/>
-              <a:t>2017/3/20</a:t>
+              <a:t>2017/3/29</a:t>
             </a:fld>
             <a:endParaRPr lang="zh-CN" altLang="en-US"/>
           </a:p>
@@ -410,7 +412,7 @@
           <a:p>
             <a:fld id="{CC7A7E01-F9FB-40F2-8C4B-BBA055699810}" type="datetimeFigureOut">
               <a:rPr lang="zh-CN" altLang="en-US" smtClean="0"/>
-              <a:t>2017/3/20</a:t>
+              <a:t>2017/3/29</a:t>
             </a:fld>
             <a:endParaRPr lang="zh-CN" altLang="en-US"/>
           </a:p>
@@ -588,7 +590,7 @@
           <a:p>
             <a:fld id="{CC7A7E01-F9FB-40F2-8C4B-BBA055699810}" type="datetimeFigureOut">
               <a:rPr lang="zh-CN" altLang="en-US" smtClean="0"/>
-              <a:t>2017/3/20</a:t>
+              <a:t>2017/3/29</a:t>
             </a:fld>
             <a:endParaRPr lang="zh-CN" altLang="en-US"/>
           </a:p>
@@ -756,7 +758,7 @@
           <a:p>
             <a:fld id="{CC7A7E01-F9FB-40F2-8C4B-BBA055699810}" type="datetimeFigureOut">
               <a:rPr lang="zh-CN" altLang="en-US" smtClean="0"/>
-              <a:t>2017/3/20</a:t>
+              <a:t>2017/3/29</a:t>
             </a:fld>
             <a:endParaRPr lang="zh-CN" altLang="en-US"/>
           </a:p>
@@ -1001,7 +1003,7 @@
           <a:p>
             <a:fld id="{CC7A7E01-F9FB-40F2-8C4B-BBA055699810}" type="datetimeFigureOut">
               <a:rPr lang="zh-CN" altLang="en-US" smtClean="0"/>
-              <a:t>2017/3/20</a:t>
+              <a:t>2017/3/29</a:t>
             </a:fld>
             <a:endParaRPr lang="zh-CN" altLang="en-US"/>
           </a:p>
@@ -1230,7 +1232,7 @@
           <a:p>
             <a:fld id="{CC7A7E01-F9FB-40F2-8C4B-BBA055699810}" type="datetimeFigureOut">
               <a:rPr lang="zh-CN" altLang="en-US" smtClean="0"/>
-              <a:t>2017/3/20</a:t>
+              <a:t>2017/3/29</a:t>
             </a:fld>
             <a:endParaRPr lang="zh-CN" altLang="en-US"/>
           </a:p>
@@ -1594,7 +1596,7 @@
           <a:p>
             <a:fld id="{CC7A7E01-F9FB-40F2-8C4B-BBA055699810}" type="datetimeFigureOut">
               <a:rPr lang="zh-CN" altLang="en-US" smtClean="0"/>
-              <a:t>2017/3/20</a:t>
+              <a:t>2017/3/29</a:t>
             </a:fld>
             <a:endParaRPr lang="zh-CN" altLang="en-US"/>
           </a:p>
@@ -1711,7 +1713,7 @@
           <a:p>
             <a:fld id="{CC7A7E01-F9FB-40F2-8C4B-BBA055699810}" type="datetimeFigureOut">
               <a:rPr lang="zh-CN" altLang="en-US" smtClean="0"/>
-              <a:t>2017/3/20</a:t>
+              <a:t>2017/3/29</a:t>
             </a:fld>
             <a:endParaRPr lang="zh-CN" altLang="en-US"/>
           </a:p>
@@ -1806,7 +1808,7 @@
           <a:p>
             <a:fld id="{CC7A7E01-F9FB-40F2-8C4B-BBA055699810}" type="datetimeFigureOut">
               <a:rPr lang="zh-CN" altLang="en-US" smtClean="0"/>
-              <a:t>2017/3/20</a:t>
+              <a:t>2017/3/29</a:t>
             </a:fld>
             <a:endParaRPr lang="zh-CN" altLang="en-US"/>
           </a:p>
@@ -2081,7 +2083,7 @@
           <a:p>
             <a:fld id="{CC7A7E01-F9FB-40F2-8C4B-BBA055699810}" type="datetimeFigureOut">
               <a:rPr lang="zh-CN" altLang="en-US" smtClean="0"/>
-              <a:t>2017/3/20</a:t>
+              <a:t>2017/3/29</a:t>
             </a:fld>
             <a:endParaRPr lang="zh-CN" altLang="en-US"/>
           </a:p>
@@ -2333,7 +2335,7 @@
           <a:p>
             <a:fld id="{CC7A7E01-F9FB-40F2-8C4B-BBA055699810}" type="datetimeFigureOut">
               <a:rPr lang="zh-CN" altLang="en-US" smtClean="0"/>
-              <a:t>2017/3/20</a:t>
+              <a:t>2017/3/29</a:t>
             </a:fld>
             <a:endParaRPr lang="zh-CN" altLang="en-US"/>
           </a:p>
@@ -2544,7 +2546,7 @@
           <a:p>
             <a:fld id="{CC7A7E01-F9FB-40F2-8C4B-BBA055699810}" type="datetimeFigureOut">
               <a:rPr lang="zh-CN" altLang="en-US" smtClean="0"/>
-              <a:t>2017/3/20</a:t>
+              <a:t>2017/3/29</a:t>
             </a:fld>
             <a:endParaRPr lang="zh-CN" altLang="en-US"/>
           </a:p>
@@ -5431,6 +5433,1485 @@
 </p:sld>
 </file>
 
+<file path=ppt/slides/slide3.xml><?xml version="1.0" encoding="utf-8"?>
+<p:sld xmlns:a="http://schemas.openxmlformats.org/drawingml/2006/main" xmlns:r="http://schemas.openxmlformats.org/officeDocument/2006/relationships" xmlns:p="http://schemas.openxmlformats.org/presentationml/2006/main">
+  <p:cSld>
+    <p:spTree>
+      <p:nvGrpSpPr>
+        <p:cNvPr id="1" name=""/>
+        <p:cNvGrpSpPr/>
+        <p:nvPr/>
+      </p:nvGrpSpPr>
+      <p:grpSpPr>
+        <a:xfrm>
+          <a:off x="0" y="0"/>
+          <a:ext cx="0" cy="0"/>
+          <a:chOff x="0" y="0"/>
+          <a:chExt cx="0" cy="0"/>
+        </a:xfrm>
+      </p:grpSpPr>
+      <p:sp>
+        <p:nvSpPr>
+          <p:cNvPr id="3" name="矩形 2"/>
+          <p:cNvSpPr/>
+          <p:nvPr/>
+        </p:nvSpPr>
+        <p:spPr>
+          <a:xfrm>
+            <a:off x="1378424" y="232008"/>
+            <a:ext cx="9362364" cy="4039738"/>
+          </a:xfrm>
+          <a:prstGeom prst="rect">
+            <a:avLst/>
+          </a:prstGeom>
+          <a:ln/>
+        </p:spPr>
+        <p:style>
+          <a:lnRef idx="0">
+            <a:schemeClr val="accent5"/>
+          </a:lnRef>
+          <a:fillRef idx="3">
+            <a:schemeClr val="accent5"/>
+          </a:fillRef>
+          <a:effectRef idx="3">
+            <a:schemeClr val="accent5"/>
+          </a:effectRef>
+          <a:fontRef idx="minor">
+            <a:schemeClr val="lt1"/>
+          </a:fontRef>
+        </p:style>
+        <p:txBody>
+          <a:bodyPr rtlCol="0" anchor="ctr"/>
+          <a:lstStyle/>
+          <a:p>
+            <a:pPr algn="ctr"/>
+            <a:endParaRPr lang="zh-CN" altLang="en-US">
+              <a:latin typeface="微软雅黑" panose="020B0503020204020204" pitchFamily="34" charset="-122"/>
+              <a:ea typeface="微软雅黑" panose="020B0503020204020204" pitchFamily="34" charset="-122"/>
+            </a:endParaRPr>
+          </a:p>
+        </p:txBody>
+      </p:sp>
+      <p:sp>
+        <p:nvSpPr>
+          <p:cNvPr id="4" name="矩形 3"/>
+          <p:cNvSpPr/>
+          <p:nvPr/>
+        </p:nvSpPr>
+        <p:spPr>
+          <a:xfrm>
+            <a:off x="1624085" y="900754"/>
+            <a:ext cx="2661314" cy="1561804"/>
+          </a:xfrm>
+          <a:prstGeom prst="rect">
+            <a:avLst/>
+          </a:prstGeom>
+          <a:ln/>
+        </p:spPr>
+        <p:style>
+          <a:lnRef idx="0">
+            <a:schemeClr val="accent6"/>
+          </a:lnRef>
+          <a:fillRef idx="3">
+            <a:schemeClr val="accent6"/>
+          </a:fillRef>
+          <a:effectRef idx="3">
+            <a:schemeClr val="accent6"/>
+          </a:effectRef>
+          <a:fontRef idx="minor">
+            <a:schemeClr val="lt1"/>
+          </a:fontRef>
+        </p:style>
+        <p:txBody>
+          <a:bodyPr rtlCol="0" anchor="ctr"/>
+          <a:lstStyle/>
+          <a:p>
+            <a:pPr algn="ctr"/>
+            <a:r>
+              <a:rPr lang="zh-CN" altLang="en-US" dirty="0">
+                <a:latin typeface="微软雅黑" panose="020B0503020204020204" pitchFamily="34" charset="-122"/>
+                <a:ea typeface="微软雅黑" panose="020B0503020204020204" pitchFamily="34" charset="-122"/>
+              </a:rPr>
+              <a:t>方法区（</a:t>
+            </a:r>
+            <a:r>
+              <a:rPr lang="en-US" altLang="zh-CN" dirty="0">
+                <a:latin typeface="微软雅黑" panose="020B0503020204020204" pitchFamily="34" charset="-122"/>
+                <a:ea typeface="微软雅黑" panose="020B0503020204020204" pitchFamily="34" charset="-122"/>
+              </a:rPr>
+              <a:t>Non-heap</a:t>
+            </a:r>
+            <a:r>
+              <a:rPr lang="zh-CN" altLang="en-US" dirty="0">
+                <a:latin typeface="微软雅黑" panose="020B0503020204020204" pitchFamily="34" charset="-122"/>
+                <a:ea typeface="微软雅黑" panose="020B0503020204020204" pitchFamily="34" charset="-122"/>
+              </a:rPr>
+              <a:t>）</a:t>
+            </a:r>
+          </a:p>
+        </p:txBody>
+      </p:sp>
+      <p:sp>
+        <p:nvSpPr>
+          <p:cNvPr id="5" name="矩形 4"/>
+          <p:cNvSpPr/>
+          <p:nvPr/>
+        </p:nvSpPr>
+        <p:spPr>
+          <a:xfrm>
+            <a:off x="1624084" y="2804616"/>
+            <a:ext cx="2661315" cy="1211961"/>
+          </a:xfrm>
+          <a:prstGeom prst="rect">
+            <a:avLst/>
+          </a:prstGeom>
+          <a:ln/>
+        </p:spPr>
+        <p:style>
+          <a:lnRef idx="0">
+            <a:schemeClr val="accent6"/>
+          </a:lnRef>
+          <a:fillRef idx="3">
+            <a:schemeClr val="accent6"/>
+          </a:fillRef>
+          <a:effectRef idx="3">
+            <a:schemeClr val="accent6"/>
+          </a:effectRef>
+          <a:fontRef idx="minor">
+            <a:schemeClr val="lt1"/>
+          </a:fontRef>
+        </p:style>
+        <p:txBody>
+          <a:bodyPr rtlCol="0" anchor="ctr"/>
+          <a:lstStyle/>
+          <a:p>
+            <a:pPr algn="ctr"/>
+            <a:r>
+              <a:rPr lang="zh-CN" altLang="en-US" dirty="0">
+                <a:latin typeface="微软雅黑" panose="020B0503020204020204" pitchFamily="34" charset="-122"/>
+                <a:ea typeface="微软雅黑" panose="020B0503020204020204" pitchFamily="34" charset="-122"/>
+              </a:rPr>
+              <a:t>堆（</a:t>
+            </a:r>
+            <a:r>
+              <a:rPr lang="en-US" altLang="zh-CN" dirty="0">
+                <a:latin typeface="微软雅黑" panose="020B0503020204020204" pitchFamily="34" charset="-122"/>
+                <a:ea typeface="微软雅黑" panose="020B0503020204020204" pitchFamily="34" charset="-122"/>
+              </a:rPr>
+              <a:t>GC</a:t>
+            </a:r>
+            <a:r>
+              <a:rPr lang="zh-CN" altLang="en-US" dirty="0">
+                <a:latin typeface="微软雅黑" panose="020B0503020204020204" pitchFamily="34" charset="-122"/>
+                <a:ea typeface="微软雅黑" panose="020B0503020204020204" pitchFamily="34" charset="-122"/>
+              </a:rPr>
+              <a:t>堆）</a:t>
+            </a:r>
+          </a:p>
+        </p:txBody>
+      </p:sp>
+      <p:sp>
+        <p:nvSpPr>
+          <p:cNvPr id="7" name="矩形 6"/>
+          <p:cNvSpPr/>
+          <p:nvPr/>
+        </p:nvSpPr>
+        <p:spPr>
+          <a:xfrm>
+            <a:off x="4735770" y="900753"/>
+            <a:ext cx="2688609" cy="1561805"/>
+          </a:xfrm>
+          <a:prstGeom prst="rect">
+            <a:avLst/>
+          </a:prstGeom>
+          <a:ln/>
+        </p:spPr>
+        <p:style>
+          <a:lnRef idx="0">
+            <a:schemeClr val="accent2"/>
+          </a:lnRef>
+          <a:fillRef idx="3">
+            <a:schemeClr val="accent2"/>
+          </a:fillRef>
+          <a:effectRef idx="3">
+            <a:schemeClr val="accent2"/>
+          </a:effectRef>
+          <a:fontRef idx="minor">
+            <a:schemeClr val="lt1"/>
+          </a:fontRef>
+        </p:style>
+        <p:txBody>
+          <a:bodyPr rtlCol="0" anchor="ctr"/>
+          <a:lstStyle/>
+          <a:p>
+            <a:pPr algn="ctr"/>
+            <a:r>
+              <a:rPr lang="zh-CN" altLang="en-US" dirty="0">
+                <a:latin typeface="微软雅黑" panose="020B0503020204020204" pitchFamily="34" charset="-122"/>
+                <a:ea typeface="微软雅黑" panose="020B0503020204020204" pitchFamily="34" charset="-122"/>
+              </a:rPr>
+              <a:t>虚拟机栈</a:t>
+            </a:r>
+          </a:p>
+        </p:txBody>
+      </p:sp>
+      <p:sp>
+        <p:nvSpPr>
+          <p:cNvPr id="8" name="矩形 7"/>
+          <p:cNvSpPr/>
+          <p:nvPr/>
+        </p:nvSpPr>
+        <p:spPr>
+          <a:xfrm>
+            <a:off x="7820165" y="900754"/>
+            <a:ext cx="2565781" cy="1561804"/>
+          </a:xfrm>
+          <a:prstGeom prst="rect">
+            <a:avLst/>
+          </a:prstGeom>
+          <a:ln/>
+        </p:spPr>
+        <p:style>
+          <a:lnRef idx="0">
+            <a:schemeClr val="accent2"/>
+          </a:lnRef>
+          <a:fillRef idx="3">
+            <a:schemeClr val="accent2"/>
+          </a:fillRef>
+          <a:effectRef idx="3">
+            <a:schemeClr val="accent2"/>
+          </a:effectRef>
+          <a:fontRef idx="minor">
+            <a:schemeClr val="lt1"/>
+          </a:fontRef>
+        </p:style>
+        <p:txBody>
+          <a:bodyPr rtlCol="0" anchor="ctr"/>
+          <a:lstStyle/>
+          <a:p>
+            <a:pPr algn="ctr"/>
+            <a:r>
+              <a:rPr lang="zh-CN" altLang="en-US" dirty="0">
+                <a:latin typeface="微软雅黑" panose="020B0503020204020204" pitchFamily="34" charset="-122"/>
+                <a:ea typeface="微软雅黑" panose="020B0503020204020204" pitchFamily="34" charset="-122"/>
+              </a:rPr>
+              <a:t>本地方法栈（</a:t>
+            </a:r>
+            <a:r>
+              <a:rPr lang="en-US" altLang="zh-CN" dirty="0">
+                <a:latin typeface="微软雅黑" panose="020B0503020204020204" pitchFamily="34" charset="-122"/>
+                <a:ea typeface="微软雅黑" panose="020B0503020204020204" pitchFamily="34" charset="-122"/>
+              </a:rPr>
+              <a:t>Native stack</a:t>
+            </a:r>
+            <a:r>
+              <a:rPr lang="zh-CN" altLang="en-US" dirty="0">
+                <a:latin typeface="微软雅黑" panose="020B0503020204020204" pitchFamily="34" charset="-122"/>
+                <a:ea typeface="微软雅黑" panose="020B0503020204020204" pitchFamily="34" charset="-122"/>
+              </a:rPr>
+              <a:t>）</a:t>
+            </a:r>
+          </a:p>
+        </p:txBody>
+      </p:sp>
+      <p:sp>
+        <p:nvSpPr>
+          <p:cNvPr id="9" name="矩形 8"/>
+          <p:cNvSpPr/>
+          <p:nvPr/>
+        </p:nvSpPr>
+        <p:spPr>
+          <a:xfrm>
+            <a:off x="4933666" y="2804616"/>
+            <a:ext cx="5158854" cy="1214650"/>
+          </a:xfrm>
+          <a:prstGeom prst="rect">
+            <a:avLst/>
+          </a:prstGeom>
+          <a:ln/>
+        </p:spPr>
+        <p:style>
+          <a:lnRef idx="0">
+            <a:schemeClr val="accent2"/>
+          </a:lnRef>
+          <a:fillRef idx="3">
+            <a:schemeClr val="accent2"/>
+          </a:fillRef>
+          <a:effectRef idx="3">
+            <a:schemeClr val="accent2"/>
+          </a:effectRef>
+          <a:fontRef idx="minor">
+            <a:schemeClr val="lt1"/>
+          </a:fontRef>
+        </p:style>
+        <p:txBody>
+          <a:bodyPr rtlCol="0" anchor="ctr"/>
+          <a:lstStyle/>
+          <a:p>
+            <a:pPr algn="ctr"/>
+            <a:r>
+              <a:rPr lang="zh-CN" altLang="en-US" dirty="0">
+                <a:latin typeface="微软雅黑" panose="020B0503020204020204" pitchFamily="34" charset="-122"/>
+                <a:ea typeface="微软雅黑" panose="020B0503020204020204" pitchFamily="34" charset="-122"/>
+              </a:rPr>
+              <a:t>程序计数器</a:t>
+            </a:r>
+          </a:p>
+        </p:txBody>
+      </p:sp>
+      <p:sp>
+        <p:nvSpPr>
+          <p:cNvPr id="10" name="文本框 9"/>
+          <p:cNvSpPr txBox="1"/>
+          <p:nvPr/>
+        </p:nvSpPr>
+        <p:spPr>
+          <a:xfrm>
+            <a:off x="4285399" y="409429"/>
+            <a:ext cx="3138980" cy="369332"/>
+          </a:xfrm>
+          <a:prstGeom prst="rect">
+            <a:avLst/>
+          </a:prstGeom>
+          <a:noFill/>
+        </p:spPr>
+        <p:txBody>
+          <a:bodyPr wrap="square" rtlCol="0">
+            <a:spAutoFit/>
+          </a:bodyPr>
+          <a:lstStyle/>
+          <a:p>
+            <a:pPr algn="ctr"/>
+            <a:r>
+              <a:rPr lang="zh-CN" altLang="en-US" dirty="0">
+                <a:solidFill>
+                  <a:schemeClr val="bg1"/>
+                </a:solidFill>
+                <a:latin typeface="微软雅黑" panose="020B0503020204020204" pitchFamily="34" charset="-122"/>
+                <a:ea typeface="微软雅黑" panose="020B0503020204020204" pitchFamily="34" charset="-122"/>
+              </a:rPr>
+              <a:t>运行时数据区</a:t>
+            </a:r>
+          </a:p>
+        </p:txBody>
+      </p:sp>
+      <p:sp>
+        <p:nvSpPr>
+          <p:cNvPr id="11" name="矩形 10"/>
+          <p:cNvSpPr/>
+          <p:nvPr/>
+        </p:nvSpPr>
+        <p:spPr>
+          <a:xfrm>
+            <a:off x="1828800" y="1951625"/>
+            <a:ext cx="2210937" cy="442693"/>
+          </a:xfrm>
+          <a:prstGeom prst="rect">
+            <a:avLst/>
+          </a:prstGeom>
+          <a:solidFill>
+            <a:schemeClr val="accent6">
+              <a:lumMod val="60000"/>
+              <a:lumOff val="40000"/>
+            </a:schemeClr>
+          </a:solidFill>
+        </p:spPr>
+        <p:style>
+          <a:lnRef idx="2">
+            <a:schemeClr val="accent6"/>
+          </a:lnRef>
+          <a:fillRef idx="1">
+            <a:schemeClr val="lt1"/>
+          </a:fillRef>
+          <a:effectRef idx="0">
+            <a:schemeClr val="accent6"/>
+          </a:effectRef>
+          <a:fontRef idx="minor">
+            <a:schemeClr val="dk1"/>
+          </a:fontRef>
+        </p:style>
+        <p:txBody>
+          <a:bodyPr rtlCol="0" anchor="ctr"/>
+          <a:lstStyle/>
+          <a:p>
+            <a:pPr algn="ctr"/>
+            <a:r>
+              <a:rPr lang="zh-CN" altLang="en-US" dirty="0">
+                <a:latin typeface="微软雅黑" panose="020B0503020204020204" pitchFamily="34" charset="-122"/>
+                <a:ea typeface="微软雅黑" panose="020B0503020204020204" pitchFamily="34" charset="-122"/>
+              </a:rPr>
+              <a:t>运行时常量区</a:t>
+            </a:r>
+          </a:p>
+        </p:txBody>
+      </p:sp>
+      <p:sp>
+        <p:nvSpPr>
+          <p:cNvPr id="12" name="矩形: 圆角 11"/>
+          <p:cNvSpPr/>
+          <p:nvPr/>
+        </p:nvSpPr>
+        <p:spPr>
+          <a:xfrm>
+            <a:off x="1719618" y="4804008"/>
+            <a:ext cx="2565781" cy="791570"/>
+          </a:xfrm>
+          <a:prstGeom prst="roundRect">
+            <a:avLst/>
+          </a:prstGeom>
+        </p:spPr>
+        <p:style>
+          <a:lnRef idx="1">
+            <a:schemeClr val="accent5"/>
+          </a:lnRef>
+          <a:fillRef idx="2">
+            <a:schemeClr val="accent5"/>
+          </a:fillRef>
+          <a:effectRef idx="1">
+            <a:schemeClr val="accent5"/>
+          </a:effectRef>
+          <a:fontRef idx="minor">
+            <a:schemeClr val="dk1"/>
+          </a:fontRef>
+        </p:style>
+        <p:txBody>
+          <a:bodyPr rtlCol="0" anchor="ctr"/>
+          <a:lstStyle/>
+          <a:p>
+            <a:pPr algn="ctr"/>
+            <a:r>
+              <a:rPr lang="zh-CN" altLang="en-US" dirty="0"/>
+              <a:t>执行引擎</a:t>
+            </a:r>
+          </a:p>
+        </p:txBody>
+      </p:sp>
+      <p:sp>
+        <p:nvSpPr>
+          <p:cNvPr id="13" name="矩形: 圆角 12"/>
+          <p:cNvSpPr/>
+          <p:nvPr/>
+        </p:nvSpPr>
+        <p:spPr>
+          <a:xfrm>
+            <a:off x="5854889" y="4804008"/>
+            <a:ext cx="2565781" cy="791570"/>
+          </a:xfrm>
+          <a:prstGeom prst="roundRect">
+            <a:avLst/>
+          </a:prstGeom>
+        </p:spPr>
+        <p:style>
+          <a:lnRef idx="1">
+            <a:schemeClr val="accent5"/>
+          </a:lnRef>
+          <a:fillRef idx="2">
+            <a:schemeClr val="accent5"/>
+          </a:fillRef>
+          <a:effectRef idx="1">
+            <a:schemeClr val="accent5"/>
+          </a:effectRef>
+          <a:fontRef idx="minor">
+            <a:schemeClr val="dk1"/>
+          </a:fontRef>
+        </p:style>
+        <p:txBody>
+          <a:bodyPr rtlCol="0" anchor="ctr"/>
+          <a:lstStyle/>
+          <a:p>
+            <a:pPr algn="ctr"/>
+            <a:r>
+              <a:rPr lang="zh-CN" altLang="en-US" dirty="0"/>
+              <a:t>本地库接口</a:t>
+            </a:r>
+            <a:endParaRPr lang="en-US" altLang="zh-CN" dirty="0"/>
+          </a:p>
+        </p:txBody>
+      </p:sp>
+      <p:sp>
+        <p:nvSpPr>
+          <p:cNvPr id="15" name="箭头: 下 14"/>
+          <p:cNvSpPr/>
+          <p:nvPr/>
+        </p:nvSpPr>
+        <p:spPr>
+          <a:xfrm>
+            <a:off x="2279177" y="4289532"/>
+            <a:ext cx="375314" cy="514476"/>
+          </a:xfrm>
+          <a:prstGeom prst="downArrow">
+            <a:avLst/>
+          </a:prstGeom>
+        </p:spPr>
+        <p:style>
+          <a:lnRef idx="1">
+            <a:schemeClr val="accent5"/>
+          </a:lnRef>
+          <a:fillRef idx="2">
+            <a:schemeClr val="accent5"/>
+          </a:fillRef>
+          <a:effectRef idx="1">
+            <a:schemeClr val="accent5"/>
+          </a:effectRef>
+          <a:fontRef idx="minor">
+            <a:schemeClr val="dk1"/>
+          </a:fontRef>
+        </p:style>
+        <p:txBody>
+          <a:bodyPr rtlCol="0" anchor="ctr"/>
+          <a:lstStyle/>
+          <a:p>
+            <a:pPr algn="ctr"/>
+            <a:endParaRPr lang="zh-CN" altLang="en-US"/>
+          </a:p>
+        </p:txBody>
+      </p:sp>
+      <p:sp>
+        <p:nvSpPr>
+          <p:cNvPr id="16" name="箭头: 下 15"/>
+          <p:cNvSpPr/>
+          <p:nvPr/>
+        </p:nvSpPr>
+        <p:spPr>
+          <a:xfrm flipV="1">
+            <a:off x="3282288" y="4277953"/>
+            <a:ext cx="375314" cy="514476"/>
+          </a:xfrm>
+          <a:prstGeom prst="downArrow">
+            <a:avLst/>
+          </a:prstGeom>
+        </p:spPr>
+        <p:style>
+          <a:lnRef idx="1">
+            <a:schemeClr val="accent5"/>
+          </a:lnRef>
+          <a:fillRef idx="2">
+            <a:schemeClr val="accent5"/>
+          </a:fillRef>
+          <a:effectRef idx="1">
+            <a:schemeClr val="accent5"/>
+          </a:effectRef>
+          <a:fontRef idx="minor">
+            <a:schemeClr val="dk1"/>
+          </a:fontRef>
+        </p:style>
+        <p:txBody>
+          <a:bodyPr rtlCol="0" anchor="ctr"/>
+          <a:lstStyle/>
+          <a:p>
+            <a:pPr algn="ctr"/>
+            <a:endParaRPr lang="zh-CN" altLang="en-US"/>
+          </a:p>
+        </p:txBody>
+      </p:sp>
+      <p:sp>
+        <p:nvSpPr>
+          <p:cNvPr id="17" name="箭头: 下 16"/>
+          <p:cNvSpPr/>
+          <p:nvPr/>
+        </p:nvSpPr>
+        <p:spPr>
+          <a:xfrm>
+            <a:off x="6486098" y="4289532"/>
+            <a:ext cx="375314" cy="514476"/>
+          </a:xfrm>
+          <a:prstGeom prst="downArrow">
+            <a:avLst/>
+          </a:prstGeom>
+        </p:spPr>
+        <p:style>
+          <a:lnRef idx="1">
+            <a:schemeClr val="accent5"/>
+          </a:lnRef>
+          <a:fillRef idx="2">
+            <a:schemeClr val="accent5"/>
+          </a:fillRef>
+          <a:effectRef idx="1">
+            <a:schemeClr val="accent5"/>
+          </a:effectRef>
+          <a:fontRef idx="minor">
+            <a:schemeClr val="dk1"/>
+          </a:fontRef>
+        </p:style>
+        <p:txBody>
+          <a:bodyPr rtlCol="0" anchor="ctr"/>
+          <a:lstStyle/>
+          <a:p>
+            <a:pPr algn="ctr"/>
+            <a:endParaRPr lang="zh-CN" altLang="en-US"/>
+          </a:p>
+        </p:txBody>
+      </p:sp>
+      <p:sp>
+        <p:nvSpPr>
+          <p:cNvPr id="18" name="箭头: 下 17"/>
+          <p:cNvSpPr/>
+          <p:nvPr/>
+        </p:nvSpPr>
+        <p:spPr>
+          <a:xfrm flipV="1">
+            <a:off x="7489209" y="4277953"/>
+            <a:ext cx="375314" cy="514476"/>
+          </a:xfrm>
+          <a:prstGeom prst="downArrow">
+            <a:avLst/>
+          </a:prstGeom>
+        </p:spPr>
+        <p:style>
+          <a:lnRef idx="1">
+            <a:schemeClr val="accent5"/>
+          </a:lnRef>
+          <a:fillRef idx="2">
+            <a:schemeClr val="accent5"/>
+          </a:fillRef>
+          <a:effectRef idx="1">
+            <a:schemeClr val="accent5"/>
+          </a:effectRef>
+          <a:fontRef idx="minor">
+            <a:schemeClr val="dk1"/>
+          </a:fontRef>
+        </p:style>
+        <p:txBody>
+          <a:bodyPr rtlCol="0" anchor="ctr"/>
+          <a:lstStyle/>
+          <a:p>
+            <a:pPr algn="ctr"/>
+            <a:endParaRPr lang="zh-CN" altLang="en-US"/>
+          </a:p>
+        </p:txBody>
+      </p:sp>
+      <p:sp>
+        <p:nvSpPr>
+          <p:cNvPr id="19" name="箭头: 右 18"/>
+          <p:cNvSpPr/>
+          <p:nvPr/>
+        </p:nvSpPr>
+        <p:spPr>
+          <a:xfrm>
+            <a:off x="4285399" y="5035166"/>
+            <a:ext cx="1569490" cy="368489"/>
+          </a:xfrm>
+          <a:prstGeom prst="rightArrow">
+            <a:avLst/>
+          </a:prstGeom>
+        </p:spPr>
+        <p:style>
+          <a:lnRef idx="1">
+            <a:schemeClr val="accent5"/>
+          </a:lnRef>
+          <a:fillRef idx="2">
+            <a:schemeClr val="accent5"/>
+          </a:fillRef>
+          <a:effectRef idx="1">
+            <a:schemeClr val="accent5"/>
+          </a:effectRef>
+          <a:fontRef idx="minor">
+            <a:schemeClr val="dk1"/>
+          </a:fontRef>
+        </p:style>
+        <p:txBody>
+          <a:bodyPr rtlCol="0" anchor="ctr"/>
+          <a:lstStyle/>
+          <a:p>
+            <a:pPr algn="ctr"/>
+            <a:endParaRPr lang="zh-CN" altLang="en-US"/>
+          </a:p>
+        </p:txBody>
+      </p:sp>
+      <p:sp>
+        <p:nvSpPr>
+          <p:cNvPr id="20" name="箭头: 右 19"/>
+          <p:cNvSpPr/>
+          <p:nvPr/>
+        </p:nvSpPr>
+        <p:spPr>
+          <a:xfrm>
+            <a:off x="8420670" y="5035166"/>
+            <a:ext cx="1569490" cy="368489"/>
+          </a:xfrm>
+          <a:prstGeom prst="rightArrow">
+            <a:avLst/>
+          </a:prstGeom>
+        </p:spPr>
+        <p:style>
+          <a:lnRef idx="1">
+            <a:schemeClr val="accent5"/>
+          </a:lnRef>
+          <a:fillRef idx="2">
+            <a:schemeClr val="accent5"/>
+          </a:fillRef>
+          <a:effectRef idx="1">
+            <a:schemeClr val="accent5"/>
+          </a:effectRef>
+          <a:fontRef idx="minor">
+            <a:schemeClr val="dk1"/>
+          </a:fontRef>
+        </p:style>
+        <p:txBody>
+          <a:bodyPr rtlCol="0" anchor="ctr"/>
+          <a:lstStyle/>
+          <a:p>
+            <a:pPr algn="ctr"/>
+            <a:endParaRPr lang="zh-CN" altLang="en-US"/>
+          </a:p>
+        </p:txBody>
+      </p:sp>
+      <p:sp>
+        <p:nvSpPr>
+          <p:cNvPr id="21" name="文本框 20"/>
+          <p:cNvSpPr txBox="1"/>
+          <p:nvPr/>
+        </p:nvSpPr>
+        <p:spPr>
+          <a:xfrm>
+            <a:off x="9990160" y="5048815"/>
+            <a:ext cx="1364777" cy="369332"/>
+          </a:xfrm>
+          <a:prstGeom prst="rect">
+            <a:avLst/>
+          </a:prstGeom>
+          <a:noFill/>
+        </p:spPr>
+        <p:txBody>
+          <a:bodyPr wrap="square" rtlCol="0">
+            <a:spAutoFit/>
+          </a:bodyPr>
+          <a:lstStyle/>
+          <a:p>
+            <a:r>
+              <a:rPr lang="zh-CN" altLang="en-US" dirty="0"/>
+              <a:t>本地方法库</a:t>
+            </a:r>
+          </a:p>
+        </p:txBody>
+      </p:sp>
+      <p:sp>
+        <p:nvSpPr>
+          <p:cNvPr id="22" name="矩形 21"/>
+          <p:cNvSpPr/>
+          <p:nvPr/>
+        </p:nvSpPr>
+        <p:spPr>
+          <a:xfrm>
+            <a:off x="1456900" y="5813941"/>
+            <a:ext cx="931457" cy="313899"/>
+          </a:xfrm>
+          <a:prstGeom prst="rect">
+            <a:avLst/>
+          </a:prstGeom>
+          <a:ln/>
+        </p:spPr>
+        <p:style>
+          <a:lnRef idx="0">
+            <a:schemeClr val="accent6"/>
+          </a:lnRef>
+          <a:fillRef idx="3">
+            <a:schemeClr val="accent6"/>
+          </a:fillRef>
+          <a:effectRef idx="3">
+            <a:schemeClr val="accent6"/>
+          </a:effectRef>
+          <a:fontRef idx="minor">
+            <a:schemeClr val="lt1"/>
+          </a:fontRef>
+        </p:style>
+        <p:txBody>
+          <a:bodyPr rtlCol="0" anchor="ctr"/>
+          <a:lstStyle/>
+          <a:p>
+            <a:pPr algn="ctr"/>
+            <a:endParaRPr lang="zh-CN" altLang="en-US" dirty="0">
+              <a:latin typeface="微软雅黑" panose="020B0503020204020204" pitchFamily="34" charset="-122"/>
+              <a:ea typeface="微软雅黑" panose="020B0503020204020204" pitchFamily="34" charset="-122"/>
+            </a:endParaRPr>
+          </a:p>
+        </p:txBody>
+      </p:sp>
+      <p:sp>
+        <p:nvSpPr>
+          <p:cNvPr id="23" name="矩形 22"/>
+          <p:cNvSpPr/>
+          <p:nvPr/>
+        </p:nvSpPr>
+        <p:spPr>
+          <a:xfrm>
+            <a:off x="1456900" y="6346203"/>
+            <a:ext cx="931457" cy="323696"/>
+          </a:xfrm>
+          <a:prstGeom prst="rect">
+            <a:avLst/>
+          </a:prstGeom>
+          <a:ln/>
+        </p:spPr>
+        <p:style>
+          <a:lnRef idx="0">
+            <a:schemeClr val="accent2"/>
+          </a:lnRef>
+          <a:fillRef idx="3">
+            <a:schemeClr val="accent2"/>
+          </a:fillRef>
+          <a:effectRef idx="3">
+            <a:schemeClr val="accent2"/>
+          </a:effectRef>
+          <a:fontRef idx="minor">
+            <a:schemeClr val="lt1"/>
+          </a:fontRef>
+        </p:style>
+        <p:txBody>
+          <a:bodyPr rtlCol="0" anchor="ctr"/>
+          <a:lstStyle/>
+          <a:p>
+            <a:pPr algn="ctr"/>
+            <a:endParaRPr lang="zh-CN" altLang="en-US" dirty="0">
+              <a:latin typeface="微软雅黑" panose="020B0503020204020204" pitchFamily="34" charset="-122"/>
+              <a:ea typeface="微软雅黑" panose="020B0503020204020204" pitchFamily="34" charset="-122"/>
+            </a:endParaRPr>
+          </a:p>
+        </p:txBody>
+      </p:sp>
+      <p:sp>
+        <p:nvSpPr>
+          <p:cNvPr id="24" name="文本框 23"/>
+          <p:cNvSpPr txBox="1"/>
+          <p:nvPr/>
+        </p:nvSpPr>
+        <p:spPr>
+          <a:xfrm>
+            <a:off x="2654491" y="5813941"/>
+            <a:ext cx="2279174" cy="369332"/>
+          </a:xfrm>
+          <a:prstGeom prst="rect">
+            <a:avLst/>
+          </a:prstGeom>
+          <a:noFill/>
+        </p:spPr>
+        <p:txBody>
+          <a:bodyPr wrap="square" rtlCol="0">
+            <a:spAutoFit/>
+          </a:bodyPr>
+          <a:lstStyle/>
+          <a:p>
+            <a:r>
+              <a:rPr lang="zh-CN" altLang="en-US" dirty="0"/>
+              <a:t>所有线程共享数据区</a:t>
+            </a:r>
+          </a:p>
+        </p:txBody>
+      </p:sp>
+      <p:sp>
+        <p:nvSpPr>
+          <p:cNvPr id="25" name="文本框 24"/>
+          <p:cNvSpPr txBox="1"/>
+          <p:nvPr/>
+        </p:nvSpPr>
+        <p:spPr>
+          <a:xfrm>
+            <a:off x="2654490" y="6323385"/>
+            <a:ext cx="2279175" cy="369332"/>
+          </a:xfrm>
+          <a:prstGeom prst="rect">
+            <a:avLst/>
+          </a:prstGeom>
+          <a:noFill/>
+        </p:spPr>
+        <p:txBody>
+          <a:bodyPr wrap="square" rtlCol="0">
+            <a:spAutoFit/>
+          </a:bodyPr>
+          <a:lstStyle/>
+          <a:p>
+            <a:r>
+              <a:rPr lang="zh-CN" altLang="en-US" dirty="0"/>
+              <a:t>每个线程独占数据区</a:t>
+            </a:r>
+          </a:p>
+        </p:txBody>
+      </p:sp>
+    </p:spTree>
+    <p:extLst>
+      <p:ext uri="{BB962C8B-B14F-4D97-AF65-F5344CB8AC3E}">
+        <p14:creationId xmlns:p14="http://schemas.microsoft.com/office/powerpoint/2010/main" val="1350899590"/>
+      </p:ext>
+    </p:extLst>
+  </p:cSld>
+  <p:clrMapOvr>
+    <a:masterClrMapping/>
+  </p:clrMapOvr>
+</p:sld>
+</file>
+
+<file path=ppt/slides/slide4.xml><?xml version="1.0" encoding="utf-8"?>
+<p:sld xmlns:a="http://schemas.openxmlformats.org/drawingml/2006/main" xmlns:r="http://schemas.openxmlformats.org/officeDocument/2006/relationships" xmlns:p="http://schemas.openxmlformats.org/presentationml/2006/main">
+  <p:cSld>
+    <p:spTree>
+      <p:nvGrpSpPr>
+        <p:cNvPr id="1" name=""/>
+        <p:cNvGrpSpPr/>
+        <p:nvPr/>
+      </p:nvGrpSpPr>
+      <p:grpSpPr>
+        <a:xfrm>
+          <a:off x="0" y="0"/>
+          <a:ext cx="0" cy="0"/>
+          <a:chOff x="0" y="0"/>
+          <a:chExt cx="0" cy="0"/>
+        </a:xfrm>
+      </p:grpSpPr>
+      <p:sp>
+        <p:nvSpPr>
+          <p:cNvPr id="2" name="矩形: 圆角 1"/>
+          <p:cNvSpPr/>
+          <p:nvPr/>
+        </p:nvSpPr>
+        <p:spPr>
+          <a:xfrm>
+            <a:off x="7615451" y="545910"/>
+            <a:ext cx="2661313" cy="395786"/>
+          </a:xfrm>
+          <a:prstGeom prst="roundRect">
+            <a:avLst/>
+          </a:prstGeom>
+        </p:spPr>
+        <p:style>
+          <a:lnRef idx="2">
+            <a:schemeClr val="accent1">
+              <a:shade val="50000"/>
+            </a:schemeClr>
+          </a:lnRef>
+          <a:fillRef idx="1">
+            <a:schemeClr val="accent1"/>
+          </a:fillRef>
+          <a:effectRef idx="0">
+            <a:schemeClr val="accent1"/>
+          </a:effectRef>
+          <a:fontRef idx="minor">
+            <a:schemeClr val="lt1"/>
+          </a:fontRef>
+        </p:style>
+        <p:txBody>
+          <a:bodyPr rtlCol="0" anchor="ctr"/>
+          <a:lstStyle/>
+          <a:p>
+            <a:pPr algn="ctr"/>
+            <a:r>
+              <a:rPr lang="zh-CN" altLang="en-US" dirty="0"/>
+              <a:t>文本字符串</a:t>
+            </a:r>
+          </a:p>
+        </p:txBody>
+      </p:sp>
+      <p:sp>
+        <p:nvSpPr>
+          <p:cNvPr id="3" name="矩形: 圆角 2"/>
+          <p:cNvSpPr/>
+          <p:nvPr/>
+        </p:nvSpPr>
+        <p:spPr>
+          <a:xfrm>
+            <a:off x="7615451" y="1080447"/>
+            <a:ext cx="2661313" cy="395786"/>
+          </a:xfrm>
+          <a:prstGeom prst="roundRect">
+            <a:avLst/>
+          </a:prstGeom>
+        </p:spPr>
+        <p:style>
+          <a:lnRef idx="2">
+            <a:schemeClr val="accent1">
+              <a:shade val="50000"/>
+            </a:schemeClr>
+          </a:lnRef>
+          <a:fillRef idx="1">
+            <a:schemeClr val="accent1"/>
+          </a:fillRef>
+          <a:effectRef idx="0">
+            <a:schemeClr val="accent1"/>
+          </a:effectRef>
+          <a:fontRef idx="minor">
+            <a:schemeClr val="lt1"/>
+          </a:fontRef>
+        </p:style>
+        <p:txBody>
+          <a:bodyPr rtlCol="0" anchor="ctr"/>
+          <a:lstStyle/>
+          <a:p>
+            <a:pPr algn="ctr"/>
+            <a:r>
+              <a:rPr lang="zh-CN" altLang="en-US" dirty="0"/>
+              <a:t>被声明为</a:t>
+            </a:r>
+            <a:r>
+              <a:rPr lang="en-US" altLang="zh-CN" dirty="0"/>
+              <a:t>final</a:t>
+            </a:r>
+            <a:r>
+              <a:rPr lang="zh-CN" altLang="en-US" dirty="0"/>
+              <a:t>的常量值</a:t>
+            </a:r>
+          </a:p>
+        </p:txBody>
+      </p:sp>
+      <p:sp>
+        <p:nvSpPr>
+          <p:cNvPr id="4" name="矩形: 圆角 3"/>
+          <p:cNvSpPr/>
+          <p:nvPr/>
+        </p:nvSpPr>
+        <p:spPr>
+          <a:xfrm>
+            <a:off x="7615450" y="1614984"/>
+            <a:ext cx="2661313" cy="395786"/>
+          </a:xfrm>
+          <a:prstGeom prst="roundRect">
+            <a:avLst/>
+          </a:prstGeom>
+        </p:spPr>
+        <p:style>
+          <a:lnRef idx="2">
+            <a:schemeClr val="accent1">
+              <a:shade val="50000"/>
+            </a:schemeClr>
+          </a:lnRef>
+          <a:fillRef idx="1">
+            <a:schemeClr val="accent1"/>
+          </a:fillRef>
+          <a:effectRef idx="0">
+            <a:schemeClr val="accent1"/>
+          </a:effectRef>
+          <a:fontRef idx="minor">
+            <a:schemeClr val="lt1"/>
+          </a:fontRef>
+        </p:style>
+        <p:txBody>
+          <a:bodyPr rtlCol="0" anchor="ctr"/>
+          <a:lstStyle/>
+          <a:p>
+            <a:pPr algn="ctr"/>
+            <a:r>
+              <a:rPr lang="zh-CN" altLang="en-US" dirty="0"/>
+              <a:t>基本数据类型的值</a:t>
+            </a:r>
+          </a:p>
+        </p:txBody>
+      </p:sp>
+      <p:sp>
+        <p:nvSpPr>
+          <p:cNvPr id="5" name="矩形: 圆角 4"/>
+          <p:cNvSpPr/>
+          <p:nvPr/>
+        </p:nvSpPr>
+        <p:spPr>
+          <a:xfrm>
+            <a:off x="7615450" y="2174541"/>
+            <a:ext cx="2661313" cy="395786"/>
+          </a:xfrm>
+          <a:prstGeom prst="roundRect">
+            <a:avLst/>
+          </a:prstGeom>
+        </p:spPr>
+        <p:style>
+          <a:lnRef idx="2">
+            <a:schemeClr val="accent1">
+              <a:shade val="50000"/>
+            </a:schemeClr>
+          </a:lnRef>
+          <a:fillRef idx="1">
+            <a:schemeClr val="accent1"/>
+          </a:fillRef>
+          <a:effectRef idx="0">
+            <a:schemeClr val="accent1"/>
+          </a:effectRef>
+          <a:fontRef idx="minor">
+            <a:schemeClr val="lt1"/>
+          </a:fontRef>
+        </p:style>
+        <p:txBody>
+          <a:bodyPr rtlCol="0" anchor="ctr"/>
+          <a:lstStyle/>
+          <a:p>
+            <a:pPr algn="ctr"/>
+            <a:r>
+              <a:rPr lang="zh-CN" altLang="en-US" dirty="0"/>
+              <a:t>其它</a:t>
+            </a:r>
+          </a:p>
+        </p:txBody>
+      </p:sp>
+      <p:sp>
+        <p:nvSpPr>
+          <p:cNvPr id="6" name="矩形: 圆角 5"/>
+          <p:cNvSpPr/>
+          <p:nvPr/>
+        </p:nvSpPr>
+        <p:spPr>
+          <a:xfrm>
+            <a:off x="7615449" y="3309580"/>
+            <a:ext cx="2661313" cy="395786"/>
+          </a:xfrm>
+          <a:prstGeom prst="roundRect">
+            <a:avLst/>
+          </a:prstGeom>
+        </p:spPr>
+        <p:style>
+          <a:lnRef idx="1">
+            <a:schemeClr val="accent2"/>
+          </a:lnRef>
+          <a:fillRef idx="3">
+            <a:schemeClr val="accent2"/>
+          </a:fillRef>
+          <a:effectRef idx="2">
+            <a:schemeClr val="accent2"/>
+          </a:effectRef>
+          <a:fontRef idx="minor">
+            <a:schemeClr val="lt1"/>
+          </a:fontRef>
+        </p:style>
+        <p:txBody>
+          <a:bodyPr rtlCol="0" anchor="ctr"/>
+          <a:lstStyle/>
+          <a:p>
+            <a:pPr algn="ctr"/>
+            <a:r>
+              <a:rPr lang="zh-CN" altLang="en-US" dirty="0"/>
+              <a:t>类和结构的完全限定名</a:t>
+            </a:r>
+          </a:p>
+        </p:txBody>
+      </p:sp>
+      <p:sp>
+        <p:nvSpPr>
+          <p:cNvPr id="7" name="矩形: 圆角 6"/>
+          <p:cNvSpPr/>
+          <p:nvPr/>
+        </p:nvSpPr>
+        <p:spPr>
+          <a:xfrm>
+            <a:off x="7615448" y="4246726"/>
+            <a:ext cx="2661313" cy="395786"/>
+          </a:xfrm>
+          <a:prstGeom prst="roundRect">
+            <a:avLst/>
+          </a:prstGeom>
+        </p:spPr>
+        <p:style>
+          <a:lnRef idx="1">
+            <a:schemeClr val="accent2"/>
+          </a:lnRef>
+          <a:fillRef idx="3">
+            <a:schemeClr val="accent2"/>
+          </a:fillRef>
+          <a:effectRef idx="2">
+            <a:schemeClr val="accent2"/>
+          </a:effectRef>
+          <a:fontRef idx="minor">
+            <a:schemeClr val="lt1"/>
+          </a:fontRef>
+        </p:style>
+        <p:txBody>
+          <a:bodyPr rtlCol="0" anchor="ctr"/>
+          <a:lstStyle/>
+          <a:p>
+            <a:pPr algn="ctr"/>
+            <a:r>
+              <a:rPr lang="zh-CN" altLang="en-US" dirty="0"/>
+              <a:t>字段名称和描述符</a:t>
+            </a:r>
+          </a:p>
+        </p:txBody>
+      </p:sp>
+      <p:sp>
+        <p:nvSpPr>
+          <p:cNvPr id="8" name="矩形: 圆角 7"/>
+          <p:cNvSpPr/>
+          <p:nvPr/>
+        </p:nvSpPr>
+        <p:spPr>
+          <a:xfrm>
+            <a:off x="7615447" y="5183872"/>
+            <a:ext cx="2661313" cy="395786"/>
+          </a:xfrm>
+          <a:prstGeom prst="roundRect">
+            <a:avLst/>
+          </a:prstGeom>
+        </p:spPr>
+        <p:style>
+          <a:lnRef idx="1">
+            <a:schemeClr val="accent2"/>
+          </a:lnRef>
+          <a:fillRef idx="3">
+            <a:schemeClr val="accent2"/>
+          </a:fillRef>
+          <a:effectRef idx="2">
+            <a:schemeClr val="accent2"/>
+          </a:effectRef>
+          <a:fontRef idx="minor">
+            <a:schemeClr val="lt1"/>
+          </a:fontRef>
+        </p:style>
+        <p:txBody>
+          <a:bodyPr rtlCol="0" anchor="ctr"/>
+          <a:lstStyle/>
+          <a:p>
+            <a:pPr algn="ctr"/>
+            <a:r>
+              <a:rPr lang="zh-CN" altLang="en-US" dirty="0"/>
+              <a:t>方法名称和描述符</a:t>
+            </a:r>
+          </a:p>
+        </p:txBody>
+      </p:sp>
+      <p:sp>
+        <p:nvSpPr>
+          <p:cNvPr id="9" name="左大括号 8"/>
+          <p:cNvSpPr/>
+          <p:nvPr/>
+        </p:nvSpPr>
+        <p:spPr>
+          <a:xfrm>
+            <a:off x="6728347" y="773372"/>
+            <a:ext cx="723332" cy="1628631"/>
+          </a:xfrm>
+          <a:prstGeom prst="leftBrace">
+            <a:avLst/>
+          </a:prstGeom>
+        </p:spPr>
+        <p:style>
+          <a:lnRef idx="1">
+            <a:schemeClr val="accent1"/>
+          </a:lnRef>
+          <a:fillRef idx="0">
+            <a:schemeClr val="accent1"/>
+          </a:fillRef>
+          <a:effectRef idx="0">
+            <a:schemeClr val="accent1"/>
+          </a:effectRef>
+          <a:fontRef idx="minor">
+            <a:schemeClr val="tx1"/>
+          </a:fontRef>
+        </p:style>
+        <p:txBody>
+          <a:bodyPr rtlCol="0" anchor="ctr"/>
+          <a:lstStyle/>
+          <a:p>
+            <a:pPr algn="ctr"/>
+            <a:endParaRPr lang="zh-CN" altLang="en-US"/>
+          </a:p>
+        </p:txBody>
+      </p:sp>
+      <p:sp>
+        <p:nvSpPr>
+          <p:cNvPr id="10" name="左大括号 9"/>
+          <p:cNvSpPr/>
+          <p:nvPr/>
+        </p:nvSpPr>
+        <p:spPr>
+          <a:xfrm>
+            <a:off x="6721523" y="3507473"/>
+            <a:ext cx="723332" cy="1924336"/>
+          </a:xfrm>
+          <a:prstGeom prst="leftBrace">
+            <a:avLst/>
+          </a:prstGeom>
+        </p:spPr>
+        <p:style>
+          <a:lnRef idx="1">
+            <a:schemeClr val="accent1"/>
+          </a:lnRef>
+          <a:fillRef idx="0">
+            <a:schemeClr val="accent1"/>
+          </a:fillRef>
+          <a:effectRef idx="0">
+            <a:schemeClr val="accent1"/>
+          </a:effectRef>
+          <a:fontRef idx="minor">
+            <a:schemeClr val="tx1"/>
+          </a:fontRef>
+        </p:style>
+        <p:txBody>
+          <a:bodyPr rtlCol="0" anchor="ctr"/>
+          <a:lstStyle/>
+          <a:p>
+            <a:pPr algn="ctr"/>
+            <a:endParaRPr lang="zh-CN" altLang="en-US"/>
+          </a:p>
+        </p:txBody>
+      </p:sp>
+      <p:sp>
+        <p:nvSpPr>
+          <p:cNvPr id="11" name="矩形: 圆角 10"/>
+          <p:cNvSpPr/>
+          <p:nvPr/>
+        </p:nvSpPr>
+        <p:spPr>
+          <a:xfrm>
+            <a:off x="3782704" y="1389794"/>
+            <a:ext cx="2661313" cy="395786"/>
+          </a:xfrm>
+          <a:prstGeom prst="roundRect">
+            <a:avLst/>
+          </a:prstGeom>
+        </p:spPr>
+        <p:style>
+          <a:lnRef idx="2">
+            <a:schemeClr val="accent1">
+              <a:shade val="50000"/>
+            </a:schemeClr>
+          </a:lnRef>
+          <a:fillRef idx="1">
+            <a:schemeClr val="accent1"/>
+          </a:fillRef>
+          <a:effectRef idx="0">
+            <a:schemeClr val="accent1"/>
+          </a:effectRef>
+          <a:fontRef idx="minor">
+            <a:schemeClr val="lt1"/>
+          </a:fontRef>
+        </p:style>
+        <p:txBody>
+          <a:bodyPr rtlCol="0" anchor="ctr"/>
+          <a:lstStyle/>
+          <a:p>
+            <a:pPr algn="ctr"/>
+            <a:r>
+              <a:rPr lang="zh-CN" altLang="en-US" dirty="0"/>
+              <a:t>字面量</a:t>
+            </a:r>
+          </a:p>
+        </p:txBody>
+      </p:sp>
+      <p:sp>
+        <p:nvSpPr>
+          <p:cNvPr id="12" name="矩形: 圆角 11"/>
+          <p:cNvSpPr/>
+          <p:nvPr/>
+        </p:nvSpPr>
+        <p:spPr>
+          <a:xfrm>
+            <a:off x="3782703" y="4246726"/>
+            <a:ext cx="2661313" cy="395786"/>
+          </a:xfrm>
+          <a:prstGeom prst="roundRect">
+            <a:avLst/>
+          </a:prstGeom>
+        </p:spPr>
+        <p:style>
+          <a:lnRef idx="1">
+            <a:schemeClr val="accent2"/>
+          </a:lnRef>
+          <a:fillRef idx="3">
+            <a:schemeClr val="accent2"/>
+          </a:fillRef>
+          <a:effectRef idx="2">
+            <a:schemeClr val="accent2"/>
+          </a:effectRef>
+          <a:fontRef idx="minor">
+            <a:schemeClr val="lt1"/>
+          </a:fontRef>
+        </p:style>
+        <p:txBody>
+          <a:bodyPr rtlCol="0" anchor="ctr"/>
+          <a:lstStyle/>
+          <a:p>
+            <a:pPr algn="ctr"/>
+            <a:r>
+              <a:rPr lang="zh-CN" altLang="en-US" dirty="0"/>
+              <a:t>符号引用</a:t>
+            </a:r>
+          </a:p>
+        </p:txBody>
+      </p:sp>
+      <p:sp>
+        <p:nvSpPr>
+          <p:cNvPr id="13" name="左大括号 12"/>
+          <p:cNvSpPr/>
+          <p:nvPr/>
+        </p:nvSpPr>
+        <p:spPr>
+          <a:xfrm>
+            <a:off x="2775042" y="1614984"/>
+            <a:ext cx="723332" cy="2861482"/>
+          </a:xfrm>
+          <a:prstGeom prst="leftBrace">
+            <a:avLst/>
+          </a:prstGeom>
+        </p:spPr>
+        <p:style>
+          <a:lnRef idx="1">
+            <a:schemeClr val="accent1"/>
+          </a:lnRef>
+          <a:fillRef idx="0">
+            <a:schemeClr val="accent1"/>
+          </a:fillRef>
+          <a:effectRef idx="0">
+            <a:schemeClr val="accent1"/>
+          </a:effectRef>
+          <a:fontRef idx="minor">
+            <a:schemeClr val="tx1"/>
+          </a:fontRef>
+        </p:style>
+        <p:txBody>
+          <a:bodyPr rtlCol="0" anchor="ctr"/>
+          <a:lstStyle/>
+          <a:p>
+            <a:pPr algn="ctr"/>
+            <a:endParaRPr lang="zh-CN" altLang="en-US"/>
+          </a:p>
+        </p:txBody>
+      </p:sp>
+      <p:sp>
+        <p:nvSpPr>
+          <p:cNvPr id="14" name="矩形: 圆角 13"/>
+          <p:cNvSpPr/>
+          <p:nvPr/>
+        </p:nvSpPr>
+        <p:spPr>
+          <a:xfrm>
+            <a:off x="245661" y="2852382"/>
+            <a:ext cx="2333767" cy="457198"/>
+          </a:xfrm>
+          <a:prstGeom prst="roundRect">
+            <a:avLst/>
+          </a:prstGeom>
+        </p:spPr>
+        <p:style>
+          <a:lnRef idx="1">
+            <a:schemeClr val="accent6"/>
+          </a:lnRef>
+          <a:fillRef idx="2">
+            <a:schemeClr val="accent6"/>
+          </a:fillRef>
+          <a:effectRef idx="1">
+            <a:schemeClr val="accent6"/>
+          </a:effectRef>
+          <a:fontRef idx="minor">
+            <a:schemeClr val="dk1"/>
+          </a:fontRef>
+        </p:style>
+        <p:txBody>
+          <a:bodyPr rtlCol="0" anchor="ctr"/>
+          <a:lstStyle/>
+          <a:p>
+            <a:pPr algn="ctr"/>
+            <a:r>
+              <a:rPr lang="zh-CN" altLang="en-US" dirty="0"/>
+              <a:t>常量池项包含的内容</a:t>
+            </a:r>
+          </a:p>
+        </p:txBody>
+      </p:sp>
+    </p:spTree>
+    <p:extLst>
+      <p:ext uri="{BB962C8B-B14F-4D97-AF65-F5344CB8AC3E}">
+        <p14:creationId xmlns:p14="http://schemas.microsoft.com/office/powerpoint/2010/main" val="2875670909"/>
+      </p:ext>
+    </p:extLst>
+  </p:cSld>
+  <p:clrMapOvr>
+    <a:masterClrMapping/>
+  </p:clrMapOvr>
+</p:sld>
+</file>
+
 <file path=ppt/theme/theme1.xml><?xml version="1.0" encoding="utf-8"?>
 <a:theme xmlns:a="http://schemas.openxmlformats.org/drawingml/2006/main" name="Office 主题​​">
   <a:themeElements>

</xml_diff>